<commit_message>
Make decimal calculations appear correct by rounding
</commit_message>
<xml_diff>
--- a/Calculator state machine.pptx
+++ b/Calculator state machine.pptx
@@ -125,12 +125,12 @@
   <pc:docChgLst>
     <pc:chgData name="6579 6579" userId="6f5a4357-75cc-4848-af69-b0e65ff995a5" providerId="ADAL" clId="{D3A1C351-E317-4341-866B-E6C3C66C2229}"/>
     <pc:docChg chg="custSel modSld">
-      <pc:chgData name="6579 6579" userId="6f5a4357-75cc-4848-af69-b0e65ff995a5" providerId="ADAL" clId="{D3A1C351-E317-4341-866B-E6C3C66C2229}" dt="2022-10-07T07:43:20.590" v="357" actId="478"/>
+      <pc:chgData name="6579 6579" userId="6f5a4357-75cc-4848-af69-b0e65ff995a5" providerId="ADAL" clId="{D3A1C351-E317-4341-866B-E6C3C66C2229}" dt="2022-10-07T08:49:46.260" v="367" actId="20577"/>
       <pc:docMkLst>
         <pc:docMk/>
       </pc:docMkLst>
       <pc:sldChg chg="addSp delSp modSp mod">
-        <pc:chgData name="6579 6579" userId="6f5a4357-75cc-4848-af69-b0e65ff995a5" providerId="ADAL" clId="{D3A1C351-E317-4341-866B-E6C3C66C2229}" dt="2022-10-07T07:43:20.590" v="357" actId="478"/>
+        <pc:chgData name="6579 6579" userId="6f5a4357-75cc-4848-af69-b0e65ff995a5" providerId="ADAL" clId="{D3A1C351-E317-4341-866B-E6C3C66C2229}" dt="2022-10-07T08:49:46.260" v="367" actId="20577"/>
         <pc:sldMkLst>
           <pc:docMk/>
           <pc:sldMk cId="1588500273" sldId="256"/>
@@ -240,7 +240,7 @@
           </ac:spMkLst>
         </pc:spChg>
         <pc:spChg chg="add mod">
-          <ac:chgData name="6579 6579" userId="6f5a4357-75cc-4848-af69-b0e65ff995a5" providerId="ADAL" clId="{D3A1C351-E317-4341-866B-E6C3C66C2229}" dt="2022-10-07T07:43:17.974" v="356" actId="1076"/>
+          <ac:chgData name="6579 6579" userId="6f5a4357-75cc-4848-af69-b0e65ff995a5" providerId="ADAL" clId="{D3A1C351-E317-4341-866B-E6C3C66C2229}" dt="2022-10-07T08:49:46.260" v="367" actId="20577"/>
           <ac:spMkLst>
             <pc:docMk/>
             <pc:sldMk cId="1588500273" sldId="256"/>
@@ -4443,7 +4443,7 @@
         <p:spPr>
           <a:xfrm>
             <a:off x="4089012" y="5402752"/>
-            <a:ext cx="2914965" cy="646331"/>
+            <a:ext cx="2398413" cy="369332"/>
           </a:xfrm>
           <a:prstGeom prst="rect">
             <a:avLst/>
@@ -4458,14 +4458,13 @@
           <a:p>
             <a:r>
               <a:rPr lang="en-US" dirty="0"/>
-              <a:t>op is “=” &amp; got input</a:t>
-            </a:r>
-          </a:p>
-          <a:p>
-            <a:r>
-              <a:rPr lang="en-US" dirty="0"/>
-              <a:t>Calculate with last operation </a:t>
-            </a:r>
+              <a:t>op is “=” &amp; got </a:t>
+            </a:r>
+            <a:r>
+              <a:rPr lang="en-US"/>
+              <a:t>no input</a:t>
+            </a:r>
+            <a:endParaRPr lang="en-US" dirty="0"/>
           </a:p>
         </p:txBody>
       </p:sp>

</xml_diff>